<commit_message>
More work on presentation
</commit_message>
<xml_diff>
--- a/Samples/Mike.NHibernateDemo/Introduction to NHibernate.pptx
+++ b/Samples/Mike.NHibernateDemo/Introduction to NHibernate.pptx
@@ -12,7 +12,8 @@
     <p:sldId id="260" r:id="rId6"/>
     <p:sldId id="261" r:id="rId7"/>
     <p:sldId id="262" r:id="rId8"/>
-    <p:sldId id="263" r:id="rId9"/>
+    <p:sldId id="264" r:id="rId9"/>
+    <p:sldId id="263" r:id="rId10"/>
   </p:sldIdLst>
   <p:sldSz cx="9144000" cy="6858000" type="screen4x3"/>
   <p:notesSz cx="6858000" cy="9144000"/>
@@ -295,6 +296,7 @@
           <a:p>
             <a:fld id="{CDCA90FA-08A4-4473-9D40-4137DCF055C8}" type="datetimeFigureOut">
               <a:rPr lang="en-US" smtClean="0"/>
+              <a:pPr/>
               <a:t>9/6/2009</a:t>
             </a:fld>
             <a:endParaRPr lang="en-GB"/>
@@ -337,6 +339,7 @@
           <a:p>
             <a:fld id="{8BBAFE0E-C265-4938-B77B-4BAC85DF3959}" type="slidenum">
               <a:rPr lang="en-GB" smtClean="0"/>
+              <a:pPr/>
               <a:t>‹#›</a:t>
             </a:fld>
             <a:endParaRPr lang="en-GB"/>
@@ -460,6 +463,7 @@
           <a:p>
             <a:fld id="{CDCA90FA-08A4-4473-9D40-4137DCF055C8}" type="datetimeFigureOut">
               <a:rPr lang="en-US" smtClean="0"/>
+              <a:pPr/>
               <a:t>9/6/2009</a:t>
             </a:fld>
             <a:endParaRPr lang="en-GB"/>
@@ -502,6 +506,7 @@
           <a:p>
             <a:fld id="{8BBAFE0E-C265-4938-B77B-4BAC85DF3959}" type="slidenum">
               <a:rPr lang="en-GB" smtClean="0"/>
+              <a:pPr/>
               <a:t>‹#›</a:t>
             </a:fld>
             <a:endParaRPr lang="en-GB"/>
@@ -635,6 +640,7 @@
           <a:p>
             <a:fld id="{CDCA90FA-08A4-4473-9D40-4137DCF055C8}" type="datetimeFigureOut">
               <a:rPr lang="en-US" smtClean="0"/>
+              <a:pPr/>
               <a:t>9/6/2009</a:t>
             </a:fld>
             <a:endParaRPr lang="en-GB"/>
@@ -677,6 +683,7 @@
           <a:p>
             <a:fld id="{8BBAFE0E-C265-4938-B77B-4BAC85DF3959}" type="slidenum">
               <a:rPr lang="en-GB" smtClean="0"/>
+              <a:pPr/>
               <a:t>‹#›</a:t>
             </a:fld>
             <a:endParaRPr lang="en-GB"/>
@@ -800,6 +807,7 @@
           <a:p>
             <a:fld id="{CDCA90FA-08A4-4473-9D40-4137DCF055C8}" type="datetimeFigureOut">
               <a:rPr lang="en-US" smtClean="0"/>
+              <a:pPr/>
               <a:t>9/6/2009</a:t>
             </a:fld>
             <a:endParaRPr lang="en-GB"/>
@@ -842,6 +850,7 @@
           <a:p>
             <a:fld id="{8BBAFE0E-C265-4938-B77B-4BAC85DF3959}" type="slidenum">
               <a:rPr lang="en-GB" smtClean="0"/>
+              <a:pPr/>
               <a:t>‹#›</a:t>
             </a:fld>
             <a:endParaRPr lang="en-GB"/>
@@ -1041,6 +1050,7 @@
           <a:p>
             <a:fld id="{CDCA90FA-08A4-4473-9D40-4137DCF055C8}" type="datetimeFigureOut">
               <a:rPr lang="en-US" smtClean="0"/>
+              <a:pPr/>
               <a:t>9/6/2009</a:t>
             </a:fld>
             <a:endParaRPr lang="en-GB"/>
@@ -1083,6 +1093,7 @@
           <a:p>
             <a:fld id="{8BBAFE0E-C265-4938-B77B-4BAC85DF3959}" type="slidenum">
               <a:rPr lang="en-GB" smtClean="0"/>
+              <a:pPr/>
               <a:t>‹#›</a:t>
             </a:fld>
             <a:endParaRPr lang="en-GB"/>
@@ -1324,6 +1335,7 @@
           <a:p>
             <a:fld id="{CDCA90FA-08A4-4473-9D40-4137DCF055C8}" type="datetimeFigureOut">
               <a:rPr lang="en-US" smtClean="0"/>
+              <a:pPr/>
               <a:t>9/6/2009</a:t>
             </a:fld>
             <a:endParaRPr lang="en-GB"/>
@@ -1366,6 +1378,7 @@
           <a:p>
             <a:fld id="{8BBAFE0E-C265-4938-B77B-4BAC85DF3959}" type="slidenum">
               <a:rPr lang="en-GB" smtClean="0"/>
+              <a:pPr/>
               <a:t>‹#›</a:t>
             </a:fld>
             <a:endParaRPr lang="en-GB"/>
@@ -1741,6 +1754,7 @@
           <a:p>
             <a:fld id="{CDCA90FA-08A4-4473-9D40-4137DCF055C8}" type="datetimeFigureOut">
               <a:rPr lang="en-US" smtClean="0"/>
+              <a:pPr/>
               <a:t>9/6/2009</a:t>
             </a:fld>
             <a:endParaRPr lang="en-GB"/>
@@ -1783,6 +1797,7 @@
           <a:p>
             <a:fld id="{8BBAFE0E-C265-4938-B77B-4BAC85DF3959}" type="slidenum">
               <a:rPr lang="en-GB" smtClean="0"/>
+              <a:pPr/>
               <a:t>‹#›</a:t>
             </a:fld>
             <a:endParaRPr lang="en-GB"/>
@@ -1854,6 +1869,7 @@
           <a:p>
             <a:fld id="{CDCA90FA-08A4-4473-9D40-4137DCF055C8}" type="datetimeFigureOut">
               <a:rPr lang="en-US" smtClean="0"/>
+              <a:pPr/>
               <a:t>9/6/2009</a:t>
             </a:fld>
             <a:endParaRPr lang="en-GB"/>
@@ -1896,6 +1912,7 @@
           <a:p>
             <a:fld id="{8BBAFE0E-C265-4938-B77B-4BAC85DF3959}" type="slidenum">
               <a:rPr lang="en-GB" smtClean="0"/>
+              <a:pPr/>
               <a:t>‹#›</a:t>
             </a:fld>
             <a:endParaRPr lang="en-GB"/>
@@ -1944,6 +1961,7 @@
           <a:p>
             <a:fld id="{CDCA90FA-08A4-4473-9D40-4137DCF055C8}" type="datetimeFigureOut">
               <a:rPr lang="en-US" smtClean="0"/>
+              <a:pPr/>
               <a:t>9/6/2009</a:t>
             </a:fld>
             <a:endParaRPr lang="en-GB"/>
@@ -1986,6 +2004,7 @@
           <a:p>
             <a:fld id="{8BBAFE0E-C265-4938-B77B-4BAC85DF3959}" type="slidenum">
               <a:rPr lang="en-GB" smtClean="0"/>
+              <a:pPr/>
               <a:t>‹#›</a:t>
             </a:fld>
             <a:endParaRPr lang="en-GB"/>
@@ -2216,6 +2235,7 @@
           <a:p>
             <a:fld id="{CDCA90FA-08A4-4473-9D40-4137DCF055C8}" type="datetimeFigureOut">
               <a:rPr lang="en-US" smtClean="0"/>
+              <a:pPr/>
               <a:t>9/6/2009</a:t>
             </a:fld>
             <a:endParaRPr lang="en-GB"/>
@@ -2258,6 +2278,7 @@
           <a:p>
             <a:fld id="{8BBAFE0E-C265-4938-B77B-4BAC85DF3959}" type="slidenum">
               <a:rPr lang="en-GB" smtClean="0"/>
+              <a:pPr/>
               <a:t>‹#›</a:t>
             </a:fld>
             <a:endParaRPr lang="en-GB"/>
@@ -2464,6 +2485,7 @@
           <a:p>
             <a:fld id="{CDCA90FA-08A4-4473-9D40-4137DCF055C8}" type="datetimeFigureOut">
               <a:rPr lang="en-US" smtClean="0"/>
+              <a:pPr/>
               <a:t>9/6/2009</a:t>
             </a:fld>
             <a:endParaRPr lang="en-GB"/>
@@ -2506,6 +2528,7 @@
           <a:p>
             <a:fld id="{8BBAFE0E-C265-4938-B77B-4BAC85DF3959}" type="slidenum">
               <a:rPr lang="en-GB" smtClean="0"/>
+              <a:pPr/>
               <a:t>‹#›</a:t>
             </a:fld>
             <a:endParaRPr lang="en-GB"/>
@@ -2672,6 +2695,7 @@
           <a:p>
             <a:fld id="{CDCA90FA-08A4-4473-9D40-4137DCF055C8}" type="datetimeFigureOut">
               <a:rPr lang="en-US" smtClean="0"/>
+              <a:pPr/>
               <a:t>9/6/2009</a:t>
             </a:fld>
             <a:endParaRPr lang="en-GB"/>
@@ -2750,6 +2774,7 @@
           <a:p>
             <a:fld id="{8BBAFE0E-C265-4938-B77B-4BAC85DF3959}" type="slidenum">
               <a:rPr lang="en-GB" smtClean="0"/>
+              <a:pPr/>
               <a:t>‹#›</a:t>
             </a:fld>
             <a:endParaRPr lang="en-GB"/>
@@ -3738,6 +3763,113 @@
         </p:nvSpPr>
         <p:spPr/>
         <p:txBody>
+          <a:bodyPr>
+            <a:normAutofit fontScale="90000"/>
+          </a:bodyPr>
+          <a:lstStyle/>
+          <a:p>
+            <a:r>
+              <a:rPr lang="en-GB" dirty="0" smtClean="0"/>
+              <a:t>How to use </a:t>
+            </a:r>
+            <a:r>
+              <a:rPr lang="en-GB" dirty="0" err="1" smtClean="0"/>
+              <a:t>Nhibernate</a:t>
+            </a:r>
+            <a:r>
+              <a:rPr lang="en-GB" dirty="0" smtClean="0"/>
+              <a:t> in a Web Application</a:t>
+            </a:r>
+            <a:endParaRPr lang="en-GB" dirty="0"/>
+          </a:p>
+        </p:txBody>
+      </p:sp>
+      <p:sp>
+        <p:nvSpPr>
+          <p:cNvPr id="3" name="Content Placeholder 2"/>
+          <p:cNvSpPr>
+            <a:spLocks noGrp="1"/>
+          </p:cNvSpPr>
+          <p:nvPr>
+            <p:ph idx="1"/>
+          </p:nvPr>
+        </p:nvSpPr>
+        <p:spPr/>
+        <p:txBody>
+          <a:bodyPr/>
+          <a:lstStyle/>
+          <a:p>
+            <a:r>
+              <a:rPr lang="en-GB" dirty="0" smtClean="0"/>
+              <a:t>Consider a framework (</a:t>
+            </a:r>
+            <a:r>
+              <a:rPr lang="en-GB" dirty="0" err="1" smtClean="0"/>
+              <a:t>S#arp</a:t>
+            </a:r>
+            <a:r>
+              <a:rPr lang="en-GB" dirty="0" smtClean="0"/>
+              <a:t>)</a:t>
+            </a:r>
+          </a:p>
+          <a:p>
+            <a:r>
+              <a:rPr lang="en-GB" dirty="0" smtClean="0"/>
+              <a:t>Create a session factory on application start</a:t>
+            </a:r>
+          </a:p>
+          <a:p>
+            <a:r>
+              <a:rPr lang="en-GB" dirty="0" smtClean="0"/>
+              <a:t>Create a session per request</a:t>
+            </a:r>
+          </a:p>
+          <a:p>
+            <a:r>
+              <a:rPr lang="en-GB" dirty="0" smtClean="0"/>
+              <a:t>Always use explicit transactions</a:t>
+            </a:r>
+            <a:endParaRPr lang="en-GB" dirty="0"/>
+          </a:p>
+        </p:txBody>
+      </p:sp>
+    </p:spTree>
+  </p:cSld>
+  <p:clrMapOvr>
+    <a:masterClrMapping/>
+  </p:clrMapOvr>
+</p:sld>
+</file>
+
+<file path=ppt/slides/slide9.xml><?xml version="1.0" encoding="utf-8"?>
+<p:sld xmlns:a="http://schemas.openxmlformats.org/drawingml/2006/main" xmlns:r="http://schemas.openxmlformats.org/officeDocument/2006/relationships" xmlns:p="http://schemas.openxmlformats.org/presentationml/2006/main">
+  <p:cSld>
+    <p:spTree>
+      <p:nvGrpSpPr>
+        <p:cNvPr id="1" name=""/>
+        <p:cNvGrpSpPr/>
+        <p:nvPr/>
+      </p:nvGrpSpPr>
+      <p:grpSpPr>
+        <a:xfrm>
+          <a:off x="0" y="0"/>
+          <a:ext cx="0" cy="0"/>
+          <a:chOff x="0" y="0"/>
+          <a:chExt cx="0" cy="0"/>
+        </a:xfrm>
+      </p:grpSpPr>
+      <p:sp>
+        <p:nvSpPr>
+          <p:cNvPr id="2" name="Title 1"/>
+          <p:cNvSpPr>
+            <a:spLocks noGrp="1"/>
+          </p:cNvSpPr>
+          <p:nvPr>
+            <p:ph type="title"/>
+          </p:nvPr>
+        </p:nvSpPr>
+        <p:spPr/>
+        <p:txBody>
           <a:bodyPr/>
           <a:lstStyle/>
           <a:p>
@@ -3767,7 +3899,7 @@
         </p:spPr>
         <p:txBody>
           <a:bodyPr>
-            <a:normAutofit/>
+            <a:normAutofit fontScale="85000" lnSpcReduction="20000"/>
           </a:bodyPr>
           <a:lstStyle/>
           <a:p>
@@ -3836,11 +3968,53 @@
             </a:pPr>
             <a:r>
               <a:rPr lang="en-GB" sz="2800" dirty="0" err="1" smtClean="0"/>
+              <a:t>S#arp</a:t>
+            </a:r>
+            <a:r>
+              <a:rPr lang="en-GB" sz="2800" dirty="0" smtClean="0"/>
+              <a:t> Architecture: </a:t>
+            </a:r>
+            <a:endParaRPr lang="en-GB" sz="2800" dirty="0" smtClean="0"/>
+          </a:p>
+          <a:p>
+            <a:pPr>
+              <a:buNone/>
+            </a:pPr>
+            <a:r>
+              <a:rPr lang="en-GB" sz="2800" dirty="0" smtClean="0">
+                <a:hlinkClick r:id="rId5"/>
+              </a:rPr>
+              <a:t>http</a:t>
+            </a:r>
+            <a:r>
+              <a:rPr lang="en-GB" sz="2800" dirty="0" smtClean="0">
+                <a:hlinkClick r:id="rId5"/>
+              </a:rPr>
+              <a:t>://code.google.com/p/sharp-architecture</a:t>
+            </a:r>
+            <a:r>
+              <a:rPr lang="en-GB" sz="2800" dirty="0" smtClean="0">
+                <a:hlinkClick r:id="rId5"/>
+              </a:rPr>
+              <a:t>/</a:t>
+            </a:r>
+            <a:endParaRPr lang="en-GB" sz="2800" dirty="0" smtClean="0"/>
+          </a:p>
+          <a:p>
+            <a:pPr>
+              <a:buNone/>
+            </a:pPr>
+            <a:r>
+              <a:rPr lang="en-GB" sz="2800" dirty="0" err="1" smtClean="0"/>
               <a:t>Nhibernate</a:t>
             </a:r>
             <a:r>
               <a:rPr lang="en-GB" sz="2800" dirty="0" smtClean="0"/>
-              <a:t> in Action </a:t>
+              <a:t> </a:t>
+            </a:r>
+            <a:r>
+              <a:rPr lang="en-GB" sz="2800" dirty="0" smtClean="0"/>
+              <a:t>in Action </a:t>
             </a:r>
           </a:p>
           <a:p>
@@ -3860,7 +4034,7 @@
           <p:nvPr/>
         </p:nvPicPr>
         <p:blipFill>
-          <a:blip r:embed="rId5"/>
+          <a:blip r:embed="rId6"/>
           <a:srcRect/>
           <a:stretch>
             <a:fillRect/>
@@ -3868,7 +4042,7 @@
         </p:blipFill>
         <p:spPr bwMode="auto">
           <a:xfrm>
-            <a:off x="5500694" y="2857496"/>
+            <a:off x="3428992" y="3571876"/>
             <a:ext cx="2667002" cy="2667002"/>
           </a:xfrm>
           <a:prstGeom prst="rect">

</xml_diff>